<commit_message>
picture of growth stages added
</commit_message>
<xml_diff>
--- a/transcriptome_soybean_WRI1_DGAT_KAS.pptx
+++ b/transcriptome_soybean_WRI1_DGAT_KAS.pptx
@@ -245,7 +245,7 @@
           <a:p>
             <a:fld id="{BF90B151-0DF7-486E-9E84-2B93A77AA56F}" type="datetimeFigureOut">
               <a:rPr lang="en-US" smtClean="0"/>
-              <a:t>5/4/21</a:t>
+              <a:t>5/17/21</a:t>
             </a:fld>
             <a:endParaRPr lang="en-US"/>
           </a:p>
@@ -413,7 +413,7 @@
           <a:p>
             <a:fld id="{BF90B151-0DF7-486E-9E84-2B93A77AA56F}" type="datetimeFigureOut">
               <a:rPr lang="en-US" smtClean="0"/>
-              <a:t>5/4/21</a:t>
+              <a:t>5/17/21</a:t>
             </a:fld>
             <a:endParaRPr lang="en-US"/>
           </a:p>
@@ -591,7 +591,7 @@
           <a:p>
             <a:fld id="{BF90B151-0DF7-486E-9E84-2B93A77AA56F}" type="datetimeFigureOut">
               <a:rPr lang="en-US" smtClean="0"/>
-              <a:t>5/4/21</a:t>
+              <a:t>5/17/21</a:t>
             </a:fld>
             <a:endParaRPr lang="en-US"/>
           </a:p>
@@ -759,7 +759,7 @@
           <a:p>
             <a:fld id="{BF90B151-0DF7-486E-9E84-2B93A77AA56F}" type="datetimeFigureOut">
               <a:rPr lang="en-US" smtClean="0"/>
-              <a:t>5/4/21</a:t>
+              <a:t>5/17/21</a:t>
             </a:fld>
             <a:endParaRPr lang="en-US"/>
           </a:p>
@@ -1004,7 +1004,7 @@
           <a:p>
             <a:fld id="{BF90B151-0DF7-486E-9E84-2B93A77AA56F}" type="datetimeFigureOut">
               <a:rPr lang="en-US" smtClean="0"/>
-              <a:t>5/4/21</a:t>
+              <a:t>5/17/21</a:t>
             </a:fld>
             <a:endParaRPr lang="en-US"/>
           </a:p>
@@ -1233,7 +1233,7 @@
           <a:p>
             <a:fld id="{BF90B151-0DF7-486E-9E84-2B93A77AA56F}" type="datetimeFigureOut">
               <a:rPr lang="en-US" smtClean="0"/>
-              <a:t>5/4/21</a:t>
+              <a:t>5/17/21</a:t>
             </a:fld>
             <a:endParaRPr lang="en-US"/>
           </a:p>
@@ -1597,7 +1597,7 @@
           <a:p>
             <a:fld id="{BF90B151-0DF7-486E-9E84-2B93A77AA56F}" type="datetimeFigureOut">
               <a:rPr lang="en-US" smtClean="0"/>
-              <a:t>5/4/21</a:t>
+              <a:t>5/17/21</a:t>
             </a:fld>
             <a:endParaRPr lang="en-US"/>
           </a:p>
@@ -1714,7 +1714,7 @@
           <a:p>
             <a:fld id="{BF90B151-0DF7-486E-9E84-2B93A77AA56F}" type="datetimeFigureOut">
               <a:rPr lang="en-US" smtClean="0"/>
-              <a:t>5/4/21</a:t>
+              <a:t>5/17/21</a:t>
             </a:fld>
             <a:endParaRPr lang="en-US"/>
           </a:p>
@@ -1809,7 +1809,7 @@
           <a:p>
             <a:fld id="{BF90B151-0DF7-486E-9E84-2B93A77AA56F}" type="datetimeFigureOut">
               <a:rPr lang="en-US" smtClean="0"/>
-              <a:t>5/4/21</a:t>
+              <a:t>5/17/21</a:t>
             </a:fld>
             <a:endParaRPr lang="en-US"/>
           </a:p>
@@ -2084,7 +2084,7 @@
           <a:p>
             <a:fld id="{BF90B151-0DF7-486E-9E84-2B93A77AA56F}" type="datetimeFigureOut">
               <a:rPr lang="en-US" smtClean="0"/>
-              <a:t>5/4/21</a:t>
+              <a:t>5/17/21</a:t>
             </a:fld>
             <a:endParaRPr lang="en-US"/>
           </a:p>
@@ -2336,7 +2336,7 @@
           <a:p>
             <a:fld id="{BF90B151-0DF7-486E-9E84-2B93A77AA56F}" type="datetimeFigureOut">
               <a:rPr lang="en-US" smtClean="0"/>
-              <a:t>5/4/21</a:t>
+              <a:t>5/17/21</a:t>
             </a:fld>
             <a:endParaRPr lang="en-US"/>
           </a:p>
@@ -2547,7 +2547,7 @@
           <a:p>
             <a:fld id="{BF90B151-0DF7-486E-9E84-2B93A77AA56F}" type="datetimeFigureOut">
               <a:rPr lang="en-US" smtClean="0"/>
-              <a:t>5/4/21</a:t>
+              <a:t>5/17/21</a:t>
             </a:fld>
             <a:endParaRPr lang="en-US"/>
           </a:p>
@@ -3099,8 +3099,8 @@
         </p:blipFill>
         <p:spPr>
           <a:xfrm>
-            <a:off x="7482395" y="1120366"/>
-            <a:ext cx="4561072" cy="4729235"/>
+            <a:off x="7482396" y="1120366"/>
+            <a:ext cx="4559349" cy="4727448"/>
           </a:xfrm>
           <a:prstGeom prst="rect">
             <a:avLst/>
@@ -7290,8 +7290,8 @@
           </a:p>
         </p:txBody>
       </p:sp>
-      <mc:AlternateContent xmlns:mc="http://schemas.openxmlformats.org/markup-compatibility/2006">
-        <mc:Choice xmlns:a14="http://schemas.microsoft.com/office/drawing/2010/main" Requires="a14">
+      <mc:AlternateContent xmlns:mc="http://schemas.openxmlformats.org/markup-compatibility/2006" xmlns:a14="http://schemas.microsoft.com/office/drawing/2010/main">
+        <mc:Choice Requires="a14">
           <p:sp>
             <p:nvSpPr>
               <p:cNvPr id="3" name="Content Placeholder 2">
@@ -7842,7 +7842,7 @@
             </p:txBody>
           </p:sp>
         </mc:Choice>
-        <mc:Fallback>
+        <mc:Fallback xmlns="">
           <p:sp>
             <p:nvSpPr>
               <p:cNvPr id="3" name="Content Placeholder 2">

</xml_diff>